<commit_message>
adds updates w3 ppts
</commit_message>
<xml_diff>
--- a/pdfs/w3/D25_.NET_AJAXFundamentals.pptx
+++ b/pdfs/w3/D25_.NET_AJAXFundamentals.pptx
@@ -373,7 +373,7 @@
           <a:p>
             <a:fld id="{9184DA70-C731-4C70-880D-CCD4705E623C}" type="datetime1">
               <a:rPr lang="en-US" smtClean="0"/>
-              <a:t>12/19/2021</a:t>
+              <a:t>12/22/2021</a:t>
             </a:fld>
             <a:endParaRPr lang="en-US" dirty="0"/>
           </a:p>
@@ -561,7 +561,7 @@
           <a:p>
             <a:fld id="{B612A279-0833-481D-8C56-F67FD0AC6C50}" type="datetime1">
               <a:rPr lang="en-US" smtClean="0"/>
-              <a:t>12/19/2021</a:t>
+              <a:t>12/22/2021</a:t>
             </a:fld>
             <a:endParaRPr lang="en-US" dirty="0"/>
           </a:p>
@@ -803,7 +803,7 @@
           <a:p>
             <a:fld id="{6587DA83-5663-4C9C-B9AA-0B40A3DAFF81}" type="datetime1">
               <a:rPr lang="en-US" smtClean="0"/>
-              <a:t>12/19/2021</a:t>
+              <a:t>12/22/2021</a:t>
             </a:fld>
             <a:endParaRPr lang="en-US" dirty="0"/>
           </a:p>
@@ -991,7 +991,7 @@
           <a:p>
             <a:fld id="{4BE1D723-8F53-4F53-90B0-1982A396982E}" type="datetime1">
               <a:rPr lang="en-US" smtClean="0"/>
-              <a:t>12/19/2021</a:t>
+              <a:t>12/22/2021</a:t>
             </a:fld>
             <a:endParaRPr lang="en-US" dirty="0"/>
           </a:p>
@@ -1364,7 +1364,7 @@
           <a:p>
             <a:fld id="{97669AF7-7BEB-44E4-9852-375E34362B5B}" type="datetime1">
               <a:rPr lang="en-US" smtClean="0"/>
-              <a:t>12/19/2021</a:t>
+              <a:t>12/22/2021</a:t>
             </a:fld>
             <a:endParaRPr lang="en-US" dirty="0"/>
           </a:p>
@@ -1619,7 +1619,7 @@
           <a:p>
             <a:fld id="{BAAAC38D-0552-4C82-B593-E6124DFADBE2}" type="datetime1">
               <a:rPr lang="en-US" smtClean="0"/>
-              <a:t>12/19/2021</a:t>
+              <a:t>12/22/2021</a:t>
             </a:fld>
             <a:endParaRPr lang="en-US" dirty="0"/>
           </a:p>
@@ -2016,7 +2016,7 @@
           <a:p>
             <a:fld id="{D9DF0F1C-5577-4ACB-BB62-DF8F3C494C7E}" type="datetime1">
               <a:rPr lang="en-US" smtClean="0"/>
-              <a:t>12/19/2021</a:t>
+              <a:t>12/22/2021</a:t>
             </a:fld>
             <a:endParaRPr lang="en-US" dirty="0"/>
           </a:p>
@@ -2152,7 +2152,7 @@
           <a:p>
             <a:fld id="{1775B394-D9F9-4F0C-B15D-605F45CB9E9F}" type="datetime1">
               <a:rPr lang="en-US" smtClean="0"/>
-              <a:t>12/19/2021</a:t>
+              <a:t>12/22/2021</a:t>
             </a:fld>
             <a:endParaRPr lang="en-US" dirty="0"/>
           </a:p>
@@ -2309,7 +2309,7 @@
           <a:p>
             <a:fld id="{39667345-2558-425A-8533-9BFDBCE15005}" type="datetime1">
               <a:rPr lang="en-US" smtClean="0"/>
-              <a:t>12/19/2021</a:t>
+              <a:t>12/22/2021</a:t>
             </a:fld>
             <a:endParaRPr lang="en-US" dirty="0"/>
           </a:p>
@@ -2638,7 +2638,7 @@
           <a:p>
             <a:fld id="{92BEA474-078D-4E9B-9B14-09A87B19DC46}" type="datetime1">
               <a:rPr lang="en-US" smtClean="0"/>
-              <a:t>12/19/2021</a:t>
+              <a:t>12/22/2021</a:t>
             </a:fld>
             <a:endParaRPr lang="en-US" dirty="0"/>
           </a:p>
@@ -2988,7 +2988,7 @@
           <a:p>
             <a:fld id="{4907D986-8816-4272-A432-0437A28A9828}" type="datetime1">
               <a:rPr lang="en-US" smtClean="0"/>
-              <a:t>12/19/2021</a:t>
+              <a:t>12/22/2021</a:t>
             </a:fld>
             <a:endParaRPr lang="en-US" dirty="0"/>
           </a:p>
@@ -3249,7 +3249,7 @@
           <a:p>
             <a:fld id="{62D6E202-B606-4609-B914-27C9371A1F6D}" type="datetime1">
               <a:rPr lang="en-US" smtClean="0"/>
-              <a:t>12/19/2021</a:t>
+              <a:t>12/22/2021</a:t>
             </a:fld>
             <a:endParaRPr lang="en-US" dirty="0"/>
           </a:p>
@@ -4054,8 +4054,8 @@
         </p:nvSpPr>
         <p:spPr>
           <a:xfrm>
-            <a:off x="1346751" y="1913328"/>
-            <a:ext cx="9808611" cy="2489339"/>
+            <a:off x="1111873" y="1913328"/>
+            <a:ext cx="10188473" cy="2718633"/>
           </a:xfrm>
         </p:spPr>
         <p:txBody>
@@ -4065,7 +4065,7 @@
           <a:lstStyle/>
           <a:p>
             <a:r>
-              <a:rPr lang="en-US" sz="2400" dirty="0">
+              <a:rPr lang="en-US" sz="2800" dirty="0">
                 <a:solidFill>
                   <a:schemeClr val="tx1"/>
                 </a:solidFill>
@@ -4079,7 +4079,7 @@
               <a:buChar char="•"/>
             </a:pPr>
             <a:r>
-              <a:rPr lang="en-US" sz="2000" dirty="0" err="1">
+              <a:rPr lang="en-US" sz="2400" dirty="0" err="1">
                 <a:solidFill>
                   <a:srgbClr val="FF0000"/>
                 </a:solidFill>
@@ -4087,11 +4087,11 @@
               <a:t>httpRequest.responseText</a:t>
             </a:r>
             <a:r>
-              <a:rPr lang="en-US" sz="2000" dirty="0"/>
+              <a:rPr lang="en-US" sz="2400" dirty="0"/>
               <a:t> </a:t>
             </a:r>
             <a:r>
-              <a:rPr lang="en-US" sz="2000" dirty="0">
+              <a:rPr lang="en-US" sz="2400" dirty="0">
                 <a:solidFill>
                   <a:schemeClr val="tx1"/>
                 </a:solidFill>
@@ -4105,7 +4105,7 @@
               <a:buChar char="•"/>
             </a:pPr>
             <a:r>
-              <a:rPr lang="en-US" sz="2000" dirty="0" err="1">
+              <a:rPr lang="en-US" sz="2400" dirty="0" err="1">
                 <a:solidFill>
                   <a:srgbClr val="FF0000"/>
                 </a:solidFill>
@@ -4113,7 +4113,7 @@
               <a:t>httpRequest.responseXML</a:t>
             </a:r>
             <a:r>
-              <a:rPr lang="en-US" sz="2000" dirty="0">
+              <a:rPr lang="en-US" sz="2400" dirty="0">
                 <a:solidFill>
                   <a:srgbClr val="FF0000"/>
                 </a:solidFill>
@@ -4121,7 +4121,7 @@
               <a:t> </a:t>
             </a:r>
             <a:r>
-              <a:rPr lang="en-US" sz="2000" dirty="0">
+              <a:rPr lang="en-US" sz="2400" dirty="0">
                 <a:solidFill>
                   <a:schemeClr val="tx1"/>
                 </a:solidFill>
@@ -4129,7 +4129,7 @@
               <a:t>– Get the response as an </a:t>
             </a:r>
             <a:r>
-              <a:rPr lang="en-US" sz="2000" dirty="0" err="1">
+              <a:rPr lang="en-US" sz="2400" dirty="0" err="1">
                 <a:solidFill>
                   <a:schemeClr val="tx1"/>
                 </a:solidFill>
@@ -4137,7 +4137,7 @@
               <a:t>XMLDocument</a:t>
             </a:r>
             <a:r>
-              <a:rPr lang="en-US" sz="2000" dirty="0">
+              <a:rPr lang="en-US" sz="2400" dirty="0">
                 <a:solidFill>
                   <a:schemeClr val="tx1"/>
                 </a:solidFill>
@@ -4214,7 +4214,7 @@
         </p:nvSpPr>
         <p:spPr>
           <a:xfrm>
-            <a:off x="2701926" y="4828888"/>
+            <a:off x="2671763" y="4808564"/>
             <a:ext cx="6848474" cy="1077218"/>
           </a:xfrm>
           <a:prstGeom prst="rect">
@@ -7507,7 +7507,17 @@
                   <a:schemeClr val="tx1"/>
                 </a:solidFill>
               </a:rPr>
-              <a:t>is invoked every time the state changes. The first thing that function needs to do is verify that the response was completed.</a:t>
+              <a:t>is invoked every time the state changes. </a:t>
+            </a:r>
+          </a:p>
+          <a:p>
+            <a:r>
+              <a:rPr lang="en-US" sz="2400" dirty="0">
+                <a:solidFill>
+                  <a:schemeClr val="tx1"/>
+                </a:solidFill>
+              </a:rPr>
+              <a:t>The first thing that the callback function needs to do is verify that the response was completed.</a:t>
             </a:r>
           </a:p>
         </p:txBody>

</xml_diff>